<commit_message>
Add the possibility to change the Pressure in Enthalpy + recompute all
</commit_message>
<xml_diff>
--- a/dev_help/maxima/conversion.pptx
+++ b/dev_help/maxima/conversion.pptx
@@ -48,7 +48,6 @@
     <p:sldId id="327" r:id="rId42"/>
     <p:sldId id="325" r:id="rId43"/>
     <p:sldId id="324" r:id="rId44"/>
-    <p:sldId id="328" r:id="rId45"/>
   </p:sldIdLst>
   <p:sldSz cx="9144000" cy="6858000" type="screen4x3"/>
   <p:notesSz cx="6858000" cy="9144000"/>
@@ -331,7 +330,7 @@
           <a:p>
             <a:fld id="{42968C2D-30BC-42AA-92C6-446775E33AE6}" type="datetimeFigureOut">
               <a:rPr lang="fr-FR" smtClean="0"/>
-              <a:t>12/02/2017</a:t>
+              <a:t>05/04/2017</a:t>
             </a:fld>
             <a:endParaRPr lang="fr-FR"/>
           </a:p>
@@ -501,7 +500,7 @@
           <a:p>
             <a:fld id="{42968C2D-30BC-42AA-92C6-446775E33AE6}" type="datetimeFigureOut">
               <a:rPr lang="fr-FR" smtClean="0"/>
-              <a:t>12/02/2017</a:t>
+              <a:t>05/04/2017</a:t>
             </a:fld>
             <a:endParaRPr lang="fr-FR"/>
           </a:p>
@@ -681,7 +680,7 @@
           <a:p>
             <a:fld id="{42968C2D-30BC-42AA-92C6-446775E33AE6}" type="datetimeFigureOut">
               <a:rPr lang="fr-FR" smtClean="0"/>
-              <a:t>12/02/2017</a:t>
+              <a:t>05/04/2017</a:t>
             </a:fld>
             <a:endParaRPr lang="fr-FR"/>
           </a:p>
@@ -851,7 +850,7 @@
           <a:p>
             <a:fld id="{42968C2D-30BC-42AA-92C6-446775E33AE6}" type="datetimeFigureOut">
               <a:rPr lang="fr-FR" smtClean="0"/>
-              <a:t>12/02/2017</a:t>
+              <a:t>05/04/2017</a:t>
             </a:fld>
             <a:endParaRPr lang="fr-FR"/>
           </a:p>
@@ -1097,7 +1096,7 @@
           <a:p>
             <a:fld id="{42968C2D-30BC-42AA-92C6-446775E33AE6}" type="datetimeFigureOut">
               <a:rPr lang="fr-FR" smtClean="0"/>
-              <a:t>12/02/2017</a:t>
+              <a:t>05/04/2017</a:t>
             </a:fld>
             <a:endParaRPr lang="fr-FR"/>
           </a:p>
@@ -1385,7 +1384,7 @@
           <a:p>
             <a:fld id="{42968C2D-30BC-42AA-92C6-446775E33AE6}" type="datetimeFigureOut">
               <a:rPr lang="fr-FR" smtClean="0"/>
-              <a:t>12/02/2017</a:t>
+              <a:t>05/04/2017</a:t>
             </a:fld>
             <a:endParaRPr lang="fr-FR"/>
           </a:p>
@@ -1807,7 +1806,7 @@
           <a:p>
             <a:fld id="{42968C2D-30BC-42AA-92C6-446775E33AE6}" type="datetimeFigureOut">
               <a:rPr lang="fr-FR" smtClean="0"/>
-              <a:t>12/02/2017</a:t>
+              <a:t>05/04/2017</a:t>
             </a:fld>
             <a:endParaRPr lang="fr-FR"/>
           </a:p>
@@ -1925,7 +1924,7 @@
           <a:p>
             <a:fld id="{42968C2D-30BC-42AA-92C6-446775E33AE6}" type="datetimeFigureOut">
               <a:rPr lang="fr-FR" smtClean="0"/>
-              <a:t>12/02/2017</a:t>
+              <a:t>05/04/2017</a:t>
             </a:fld>
             <a:endParaRPr lang="fr-FR"/>
           </a:p>
@@ -2020,7 +2019,7 @@
           <a:p>
             <a:fld id="{42968C2D-30BC-42AA-92C6-446775E33AE6}" type="datetimeFigureOut">
               <a:rPr lang="fr-FR" smtClean="0"/>
-              <a:t>12/02/2017</a:t>
+              <a:t>05/04/2017</a:t>
             </a:fld>
             <a:endParaRPr lang="fr-FR"/>
           </a:p>
@@ -2297,7 +2296,7 @@
           <a:p>
             <a:fld id="{42968C2D-30BC-42AA-92C6-446775E33AE6}" type="datetimeFigureOut">
               <a:rPr lang="fr-FR" smtClean="0"/>
-              <a:t>12/02/2017</a:t>
+              <a:t>05/04/2017</a:t>
             </a:fld>
             <a:endParaRPr lang="fr-FR"/>
           </a:p>
@@ -2550,7 +2549,7 @@
           <a:p>
             <a:fld id="{42968C2D-30BC-42AA-92C6-446775E33AE6}" type="datetimeFigureOut">
               <a:rPr lang="fr-FR" smtClean="0"/>
-              <a:t>12/02/2017</a:t>
+              <a:t>05/04/2017</a:t>
             </a:fld>
             <a:endParaRPr lang="fr-FR"/>
           </a:p>
@@ -2763,7 +2762,7 @@
           <a:p>
             <a:fld id="{42968C2D-30BC-42AA-92C6-446775E33AE6}" type="datetimeFigureOut">
               <a:rPr lang="fr-FR" smtClean="0"/>
-              <a:t>12/02/2017</a:t>
+              <a:t>05/04/2017</a:t>
             </a:fld>
             <a:endParaRPr lang="fr-FR"/>
           </a:p>
@@ -12921,18 +12920,7 @@
                             <a:srgbClr val="FF0000"/>
                           </a:solidFill>
                         </a:rPr>
-                        <m:t>10</m:t>
-                      </m:r>
-                      <m:r>
-                        <m:rPr>
-                          <m:nor/>
-                        </m:rPr>
-                        <a:rPr lang="fr-FR" dirty="0" smtClean="0">
-                          <a:solidFill>
-                            <a:srgbClr val="FF0000"/>
-                          </a:solidFill>
-                        </a:rPr>
-                        <m:t>_</m:t>
+                        <m:t>10_</m:t>
                       </m:r>
                       <m:r>
                         <a:rPr lang="fr-FR" b="0" i="1" smtClean="0">
@@ -13033,18 +13021,7 @@
                             <a:srgbClr val="FF0000"/>
                           </a:solidFill>
                         </a:rPr>
-                        <m:t>10</m:t>
-                      </m:r>
-                      <m:r>
-                        <m:rPr>
-                          <m:nor/>
-                        </m:rPr>
-                        <a:rPr lang="fr-FR" dirty="0">
-                          <a:solidFill>
-                            <a:srgbClr val="FF0000"/>
-                          </a:solidFill>
-                        </a:rPr>
-                        <m:t>_</m:t>
+                        <m:t>10_</m:t>
                       </m:r>
                       <m:r>
                         <a:rPr lang="fr-FR" b="0" i="1" smtClean="0">
@@ -13114,18 +13091,7 @@
                             <a:srgbClr val="FF0000"/>
                           </a:solidFill>
                         </a:rPr>
-                        <m:t>10</m:t>
-                      </m:r>
-                      <m:r>
-                        <m:rPr>
-                          <m:nor/>
-                        </m:rPr>
-                        <a:rPr lang="fr-FR" dirty="0">
-                          <a:solidFill>
-                            <a:srgbClr val="FF0000"/>
-                          </a:solidFill>
-                        </a:rPr>
-                        <m:t>_</m:t>
+                        <m:t>10_</m:t>
                       </m:r>
                       <m:r>
                         <a:rPr lang="fr-FR" i="1">
@@ -16374,18 +16340,7 @@
                             <a:srgbClr val="FF0000"/>
                           </a:solidFill>
                         </a:rPr>
-                        <m:t>10</m:t>
-                      </m:r>
-                      <m:r>
-                        <m:rPr>
-                          <m:nor/>
-                        </m:rPr>
-                        <a:rPr lang="fr-FR" dirty="0" smtClean="0">
-                          <a:solidFill>
-                            <a:srgbClr val="FF0000"/>
-                          </a:solidFill>
-                        </a:rPr>
-                        <m:t>_</m:t>
+                        <m:t>10_</m:t>
                       </m:r>
                       <m:r>
                         <a:rPr lang="fr-FR" b="0" i="1" smtClean="0">
@@ -16486,18 +16441,7 @@
                             <a:srgbClr val="FF0000"/>
                           </a:solidFill>
                         </a:rPr>
-                        <m:t>10</m:t>
-                      </m:r>
-                      <m:r>
-                        <m:rPr>
-                          <m:nor/>
-                        </m:rPr>
-                        <a:rPr lang="fr-FR" dirty="0">
-                          <a:solidFill>
-                            <a:srgbClr val="FF0000"/>
-                          </a:solidFill>
-                        </a:rPr>
-                        <m:t>_</m:t>
+                        <m:t>10_</m:t>
                       </m:r>
                       <m:r>
                         <a:rPr lang="fr-FR" b="0" i="1" smtClean="0">
@@ -16567,18 +16511,7 @@
                             <a:srgbClr val="FF0000"/>
                           </a:solidFill>
                         </a:rPr>
-                        <m:t>10</m:t>
-                      </m:r>
-                      <m:r>
-                        <m:rPr>
-                          <m:nor/>
-                        </m:rPr>
-                        <a:rPr lang="fr-FR" dirty="0">
-                          <a:solidFill>
-                            <a:srgbClr val="FF0000"/>
-                          </a:solidFill>
-                        </a:rPr>
-                        <m:t>_</m:t>
+                        <m:t>10_</m:t>
                       </m:r>
                       <m:r>
                         <a:rPr lang="fr-FR" i="1">
@@ -16652,25 +16585,7 @@
                               </a:solidFill>
                               <a:latin typeface="Cambria Math"/>
                             </a:rPr>
-                            <m:t>100</m:t>
-                          </m:r>
-                          <m:r>
-                            <a:rPr lang="fr-FR" b="0" i="0" smtClean="0">
-                              <a:solidFill>
-                                <a:srgbClr val="FF0000"/>
-                              </a:solidFill>
-                              <a:latin typeface="Cambria Math"/>
-                            </a:rPr>
-                            <m:t>.</m:t>
-                          </m:r>
-                          <m:r>
-                            <a:rPr lang="fr-FR" b="0" i="0" smtClean="0">
-                              <a:solidFill>
-                                <a:srgbClr val="FF0000"/>
-                              </a:solidFill>
-                              <a:latin typeface="Cambria Math"/>
-                            </a:rPr>
-                            <m:t>0</m:t>
+                            <m:t>100.0</m:t>
                           </m:r>
                         </m:den>
                       </m:f>
@@ -26515,7 +26430,7 @@
         <p:spPr>
           <a:xfrm>
             <a:off x="1474475" y="5485953"/>
-            <a:ext cx="1628266" cy="338554"/>
+            <a:ext cx="2080826" cy="338554"/>
           </a:xfrm>
           <a:prstGeom prst="rect">
             <a:avLst/>
@@ -26529,16 +26444,24 @@
           <a:lstStyle/>
           <a:p>
             <a:r>
+              <a:rPr lang="fr-FR" sz="1600" dirty="0" smtClean="0"/>
+              <a:t>Will </a:t>
+            </a:r>
+            <a:r>
               <a:rPr lang="fr-FR" sz="1600" dirty="0" err="1" smtClean="0"/>
-              <a:t>eDraw</a:t>
+              <a:t>be</a:t>
             </a:r>
             <a:r>
               <a:rPr lang="fr-FR" sz="1600" dirty="0" smtClean="0"/>
-              <a:t> = </a:t>
+              <a:t> </a:t>
             </a:r>
             <a:r>
               <a:rPr lang="fr-FR" sz="1600" dirty="0" err="1" smtClean="0"/>
-              <a:t>Hv,logPv</a:t>
+              <a:t>displayed</a:t>
+            </a:r>
+            <a:r>
+              <a:rPr lang="fr-FR" sz="1600" smtClean="0"/>
+              <a:t> in X,Y</a:t>
             </a:r>
             <a:endParaRPr lang="fr-FR" dirty="0"/>
           </a:p>
@@ -26548,1086 +26471,6 @@
     <p:extLst>
       <p:ext uri="{BB962C8B-B14F-4D97-AF65-F5344CB8AC3E}">
         <p14:creationId xmlns:p14="http://schemas.microsoft.com/office/powerpoint/2010/main" val="3952141343"/>
-      </p:ext>
-    </p:extLst>
-  </p:cSld>
-  <p:clrMapOvr>
-    <a:masterClrMapping/>
-  </p:clrMapOvr>
-</p:sld>
-</file>
-
-<file path=ppt/slides/slide44.xml><?xml version="1.0" encoding="utf-8"?>
-<p:sld xmlns:a="http://schemas.openxmlformats.org/drawingml/2006/main" xmlns:r="http://schemas.openxmlformats.org/officeDocument/2006/relationships" xmlns:p="http://schemas.openxmlformats.org/presentationml/2006/main">
-  <p:cSld>
-    <p:spTree>
-      <p:nvGrpSpPr>
-        <p:cNvPr id="1" name=""/>
-        <p:cNvGrpSpPr/>
-        <p:nvPr/>
-      </p:nvGrpSpPr>
-      <p:grpSpPr>
-        <a:xfrm>
-          <a:off x="0" y="0"/>
-          <a:ext cx="0" cy="0"/>
-          <a:chOff x="0" y="0"/>
-          <a:chExt cx="0" cy="0"/>
-        </a:xfrm>
-      </p:grpSpPr>
-      <p:sp>
-        <p:nvSpPr>
-          <p:cNvPr id="2" name="Rectangle 1"/>
-          <p:cNvSpPr/>
-          <p:nvPr/>
-        </p:nvSpPr>
-        <p:spPr>
-          <a:xfrm>
-            <a:off x="806535" y="829698"/>
-            <a:ext cx="1872208" cy="1904597"/>
-          </a:xfrm>
-          <a:prstGeom prst="rect">
-            <a:avLst/>
-          </a:prstGeom>
-        </p:spPr>
-        <p:style>
-          <a:lnRef idx="2">
-            <a:schemeClr val="accent1"/>
-          </a:lnRef>
-          <a:fillRef idx="1">
-            <a:schemeClr val="lt1"/>
-          </a:fillRef>
-          <a:effectRef idx="0">
-            <a:schemeClr val="accent1"/>
-          </a:effectRef>
-          <a:fontRef idx="minor">
-            <a:schemeClr val="dk1"/>
-          </a:fontRef>
-        </p:style>
-        <p:txBody>
-          <a:bodyPr rtlCol="0" anchor="ctr"/>
-          <a:lstStyle/>
-          <a:p>
-            <a:pPr algn="ctr"/>
-            <a:endParaRPr lang="fr-FR"/>
-          </a:p>
-        </p:txBody>
-      </p:sp>
-      <p:sp>
-        <p:nvSpPr>
-          <p:cNvPr id="3" name="Ellipse 2"/>
-          <p:cNvSpPr/>
-          <p:nvPr/>
-        </p:nvSpPr>
-        <p:spPr>
-          <a:xfrm>
-            <a:off x="806534" y="875864"/>
-            <a:ext cx="1821251" cy="1858431"/>
-          </a:xfrm>
-          <a:prstGeom prst="ellipse">
-            <a:avLst/>
-          </a:prstGeom>
-        </p:spPr>
-        <p:style>
-          <a:lnRef idx="0">
-            <a:schemeClr val="accent2"/>
-          </a:lnRef>
-          <a:fillRef idx="3">
-            <a:schemeClr val="accent2"/>
-          </a:fillRef>
-          <a:effectRef idx="3">
-            <a:schemeClr val="accent2"/>
-          </a:effectRef>
-          <a:fontRef idx="minor">
-            <a:schemeClr val="lt1"/>
-          </a:fontRef>
-        </p:style>
-        <p:txBody>
-          <a:bodyPr rtlCol="0" anchor="ctr"/>
-          <a:lstStyle/>
-          <a:p>
-            <a:pPr algn="ctr"/>
-            <a:endParaRPr lang="fr-FR" dirty="0"/>
-          </a:p>
-        </p:txBody>
-      </p:sp>
-      <p:cxnSp>
-        <p:nvCxnSpPr>
-          <p:cNvPr id="10" name="Connecteur droit 9"/>
-          <p:cNvCxnSpPr>
-            <a:endCxn id="2" idx="3"/>
-          </p:cNvCxnSpPr>
-          <p:nvPr/>
-        </p:nvCxnSpPr>
-        <p:spPr>
-          <a:xfrm flipV="1">
-            <a:off x="1717159" y="1781997"/>
-            <a:ext cx="961584" cy="27999"/>
-          </a:xfrm>
-          <a:prstGeom prst="line">
-            <a:avLst/>
-          </a:prstGeom>
-        </p:spPr>
-        <p:style>
-          <a:lnRef idx="1">
-            <a:schemeClr val="accent1"/>
-          </a:lnRef>
-          <a:fillRef idx="0">
-            <a:schemeClr val="accent1"/>
-          </a:fillRef>
-          <a:effectRef idx="0">
-            <a:schemeClr val="accent1"/>
-          </a:effectRef>
-          <a:fontRef idx="minor">
-            <a:schemeClr val="tx1"/>
-          </a:fontRef>
-        </p:style>
-      </p:cxnSp>
-      <p:sp>
-        <p:nvSpPr>
-          <p:cNvPr id="9" name="ZoneTexte 8"/>
-          <p:cNvSpPr txBox="1"/>
-          <p:nvPr/>
-        </p:nvSpPr>
-        <p:spPr>
-          <a:xfrm>
-            <a:off x="5047083" y="178128"/>
-            <a:ext cx="3838179" cy="1477328"/>
-          </a:xfrm>
-          <a:prstGeom prst="rect">
-            <a:avLst/>
-          </a:prstGeom>
-          <a:noFill/>
-        </p:spPr>
-        <p:txBody>
-          <a:bodyPr wrap="square" rtlCol="0">
-            <a:spAutoFit/>
-          </a:bodyPr>
-          <a:lstStyle/>
-          <a:p>
-            <a:r>
-              <a:rPr lang="fr-FR" dirty="0" smtClean="0"/>
-              <a:t>Value </a:t>
-            </a:r>
-            <a:r>
-              <a:rPr lang="fr-FR" dirty="0" err="1" smtClean="0"/>
-              <a:t>stored</a:t>
-            </a:r>
-            <a:r>
-              <a:rPr lang="fr-FR" dirty="0" smtClean="0"/>
-              <a:t> in </a:t>
-            </a:r>
-            <a:r>
-              <a:rPr lang="fr-FR" dirty="0" err="1" smtClean="0"/>
-              <a:t>eDraw</a:t>
-            </a:r>
-            <a:r>
-              <a:rPr lang="fr-FR" dirty="0" smtClean="0"/>
-              <a:t> </a:t>
-            </a:r>
-            <a:r>
-              <a:rPr lang="fr-FR" dirty="0" err="1" smtClean="0"/>
-              <a:t>is</a:t>
-            </a:r>
-            <a:r>
-              <a:rPr lang="fr-FR" dirty="0" smtClean="0"/>
-              <a:t> = </a:t>
-            </a:r>
-            <a:r>
-              <a:rPr lang="fr-FR" dirty="0" err="1" smtClean="0"/>
-              <a:t>Hv</a:t>
-            </a:r>
-            <a:r>
-              <a:rPr lang="fr-FR" dirty="0" smtClean="0"/>
-              <a:t>, log10Pv</a:t>
-            </a:r>
-            <a:endParaRPr lang="fr-FR" dirty="0" smtClean="0"/>
-          </a:p>
-          <a:p>
-            <a:r>
-              <a:rPr lang="fr-FR" dirty="0" smtClean="0">
-                <a:sym typeface="Wingdings" panose="05000000000000000000" pitchFamily="2" charset="2"/>
-              </a:rPr>
-              <a:t> </a:t>
-            </a:r>
-            <a:r>
-              <a:rPr lang="fr-FR" dirty="0" err="1" smtClean="0">
-                <a:sym typeface="Wingdings" panose="05000000000000000000" pitchFamily="2" charset="2"/>
-              </a:rPr>
-              <a:t>Hv</a:t>
-            </a:r>
-            <a:r>
-              <a:rPr lang="fr-FR" dirty="0" smtClean="0">
-                <a:sym typeface="Wingdings" panose="05000000000000000000" pitchFamily="2" charset="2"/>
-              </a:rPr>
-              <a:t>, </a:t>
-            </a:r>
-            <a:r>
-              <a:rPr lang="fr-FR" dirty="0" err="1" smtClean="0">
-                <a:sym typeface="Wingdings" panose="05000000000000000000" pitchFamily="2" charset="2"/>
-              </a:rPr>
-              <a:t>exp</a:t>
-            </a:r>
-            <a:r>
-              <a:rPr lang="fr-FR" dirty="0" smtClean="0">
-                <a:sym typeface="Wingdings" panose="05000000000000000000" pitchFamily="2" charset="2"/>
-              </a:rPr>
-              <a:t>(Log10Pv*log(10</a:t>
-            </a:r>
-            <a:r>
-              <a:rPr lang="fr-FR" dirty="0" smtClean="0">
-                <a:sym typeface="Wingdings" panose="05000000000000000000" pitchFamily="2" charset="2"/>
-              </a:rPr>
-              <a:t>))</a:t>
-            </a:r>
-            <a:endParaRPr lang="fr-FR" dirty="0"/>
-          </a:p>
-          <a:p>
-            <a:pPr marL="285750" indent="-285750">
-              <a:buFont typeface="Wingdings"/>
-              <a:buChar char="à"/>
-            </a:pPr>
-            <a:r>
-              <a:rPr lang="fr-FR" dirty="0" err="1" smtClean="0">
-                <a:sym typeface="Wingdings" panose="05000000000000000000" pitchFamily="2" charset="2"/>
-              </a:rPr>
-              <a:t>Hv</a:t>
-            </a:r>
-            <a:r>
-              <a:rPr lang="fr-FR" dirty="0" smtClean="0">
-                <a:sym typeface="Wingdings" panose="05000000000000000000" pitchFamily="2" charset="2"/>
-              </a:rPr>
-              <a:t>, </a:t>
-            </a:r>
-            <a:r>
-              <a:rPr lang="fr-FR" dirty="0" err="1" smtClean="0">
-                <a:sym typeface="Wingdings" panose="05000000000000000000" pitchFamily="2" charset="2"/>
-              </a:rPr>
-              <a:t>Pv</a:t>
-            </a:r>
-            <a:endParaRPr lang="fr-FR" dirty="0" smtClean="0">
-              <a:sym typeface="Wingdings" panose="05000000000000000000" pitchFamily="2" charset="2"/>
-            </a:endParaRPr>
-          </a:p>
-          <a:p>
-            <a:pPr marL="285750" indent="-285750">
-              <a:buFont typeface="Wingdings"/>
-              <a:buChar char="à"/>
-            </a:pPr>
-            <a:r>
-              <a:rPr lang="fr-FR" dirty="0" err="1" smtClean="0"/>
-              <a:t>getXmoH</a:t>
-            </a:r>
-            <a:r>
-              <a:rPr lang="fr-FR" dirty="0" smtClean="0"/>
-              <a:t>(</a:t>
-            </a:r>
-            <a:r>
-              <a:rPr lang="fr-FR" dirty="0" err="1" smtClean="0"/>
-              <a:t>Hv</a:t>
-            </a:r>
-            <a:r>
-              <a:rPr lang="fr-FR" dirty="0" smtClean="0"/>
-              <a:t>), </a:t>
-            </a:r>
-            <a:r>
-              <a:rPr lang="fr-FR" dirty="0" err="1" smtClean="0"/>
-              <a:t>getYmoP</a:t>
-            </a:r>
-            <a:r>
-              <a:rPr lang="fr-FR" dirty="0" smtClean="0"/>
-              <a:t>(</a:t>
-            </a:r>
-            <a:r>
-              <a:rPr lang="fr-FR" dirty="0" err="1" smtClean="0"/>
-              <a:t>Pv</a:t>
-            </a:r>
-            <a:r>
-              <a:rPr lang="fr-FR" dirty="0" smtClean="0"/>
-              <a:t>)</a:t>
-            </a:r>
-            <a:endParaRPr lang="fr-FR" dirty="0" smtClean="0">
-              <a:sym typeface="Wingdings" panose="05000000000000000000" pitchFamily="2" charset="2"/>
-            </a:endParaRPr>
-          </a:p>
-          <a:p>
-            <a:pPr marL="285750" indent="-285750">
-              <a:buFont typeface="Wingdings"/>
-              <a:buChar char="à"/>
-            </a:pPr>
-            <a:r>
-              <a:rPr lang="fr-FR" dirty="0" err="1" smtClean="0">
-                <a:sym typeface="Wingdings" panose="05000000000000000000" pitchFamily="2" charset="2"/>
-              </a:rPr>
-              <a:t>xmH</a:t>
-            </a:r>
-            <a:r>
-              <a:rPr lang="fr-FR" dirty="0" smtClean="0">
-                <a:sym typeface="Wingdings" panose="05000000000000000000" pitchFamily="2" charset="2"/>
-              </a:rPr>
-              <a:t>, </a:t>
-            </a:r>
-            <a:r>
-              <a:rPr lang="fr-FR" dirty="0" err="1" smtClean="0">
-                <a:sym typeface="Wingdings" panose="05000000000000000000" pitchFamily="2" charset="2"/>
-              </a:rPr>
-              <a:t>ymP</a:t>
-            </a:r>
-            <a:endParaRPr lang="fr-FR" dirty="0"/>
-          </a:p>
-        </p:txBody>
-      </p:sp>
-      <p:sp>
-        <p:nvSpPr>
-          <p:cNvPr id="12" name="ZoneTexte 11"/>
-          <p:cNvSpPr txBox="1"/>
-          <p:nvPr/>
-        </p:nvSpPr>
-        <p:spPr>
-          <a:xfrm>
-            <a:off x="219384" y="3044841"/>
-            <a:ext cx="1130438" cy="369332"/>
-          </a:xfrm>
-          <a:prstGeom prst="rect">
-            <a:avLst/>
-          </a:prstGeom>
-          <a:noFill/>
-        </p:spPr>
-        <p:txBody>
-          <a:bodyPr wrap="none" rtlCol="0">
-            <a:spAutoFit/>
-          </a:bodyPr>
-          <a:lstStyle/>
-          <a:p>
-            <a:r>
-              <a:rPr lang="fr-FR" dirty="0" err="1" smtClean="0"/>
-              <a:t>xmH</a:t>
-            </a:r>
-            <a:r>
-              <a:rPr lang="fr-FR" dirty="0" smtClean="0"/>
-              <a:t>, </a:t>
-            </a:r>
-            <a:r>
-              <a:rPr lang="fr-FR" dirty="0" err="1" smtClean="0"/>
-              <a:t>ymP</a:t>
-            </a:r>
-            <a:endParaRPr lang="fr-FR" dirty="0"/>
-          </a:p>
-        </p:txBody>
-      </p:sp>
-      <p:cxnSp>
-        <p:nvCxnSpPr>
-          <p:cNvPr id="14" name="Connecteur droit avec flèche 13"/>
-          <p:cNvCxnSpPr>
-            <a:endCxn id="12" idx="0"/>
-          </p:cNvCxnSpPr>
-          <p:nvPr/>
-        </p:nvCxnSpPr>
-        <p:spPr>
-          <a:xfrm flipH="1">
-            <a:off x="784603" y="1809996"/>
-            <a:ext cx="932556" cy="1234845"/>
-          </a:xfrm>
-          <a:prstGeom prst="straightConnector1">
-            <a:avLst/>
-          </a:prstGeom>
-          <a:ln>
-            <a:tailEnd type="arrow"/>
-          </a:ln>
-        </p:spPr>
-        <p:style>
-          <a:lnRef idx="1">
-            <a:schemeClr val="accent1"/>
-          </a:lnRef>
-          <a:fillRef idx="0">
-            <a:schemeClr val="accent1"/>
-          </a:fillRef>
-          <a:effectRef idx="0">
-            <a:schemeClr val="accent1"/>
-          </a:effectRef>
-          <a:fontRef idx="minor">
-            <a:schemeClr val="tx1"/>
-          </a:fontRef>
-        </p:style>
-      </p:cxnSp>
-      <p:sp>
-        <p:nvSpPr>
-          <p:cNvPr id="15" name="ZoneTexte 14"/>
-          <p:cNvSpPr txBox="1"/>
-          <p:nvPr/>
-        </p:nvSpPr>
-        <p:spPr>
-          <a:xfrm>
-            <a:off x="2043101" y="1412665"/>
-            <a:ext cx="494046" cy="369332"/>
-          </a:xfrm>
-          <a:prstGeom prst="rect">
-            <a:avLst/>
-          </a:prstGeom>
-          <a:noFill/>
-        </p:spPr>
-        <p:txBody>
-          <a:bodyPr wrap="none" rtlCol="0">
-            <a:spAutoFit/>
-          </a:bodyPr>
-          <a:lstStyle/>
-          <a:p>
-            <a:r>
-              <a:rPr lang="fr-FR" dirty="0" err="1" smtClean="0"/>
-              <a:t>Rm</a:t>
-            </a:r>
-            <a:endParaRPr lang="fr-FR" dirty="0"/>
-          </a:p>
-        </p:txBody>
-      </p:sp>
-      <p:sp>
-        <p:nvSpPr>
-          <p:cNvPr id="16" name="ZoneTexte 15"/>
-          <p:cNvSpPr txBox="1"/>
-          <p:nvPr/>
-        </p:nvSpPr>
-        <p:spPr>
-          <a:xfrm>
-            <a:off x="323528" y="3602649"/>
-            <a:ext cx="8640960" cy="1477328"/>
-          </a:xfrm>
-          <a:prstGeom prst="rect">
-            <a:avLst/>
-          </a:prstGeom>
-          <a:noFill/>
-        </p:spPr>
-        <p:txBody>
-          <a:bodyPr wrap="square" rtlCol="0">
-            <a:spAutoFit/>
-          </a:bodyPr>
-          <a:lstStyle/>
-          <a:p>
-            <a:r>
-              <a:rPr lang="fr-FR" dirty="0" smtClean="0"/>
-              <a:t>xmH0 = </a:t>
-            </a:r>
-            <a:r>
-              <a:rPr lang="fr-FR" dirty="0" err="1" smtClean="0"/>
-              <a:t>xmH-Rm</a:t>
-            </a:r>
-            <a:r>
-              <a:rPr lang="fr-FR" dirty="0" smtClean="0"/>
-              <a:t>	</a:t>
-            </a:r>
-            <a:r>
-              <a:rPr lang="fr-FR" dirty="0" smtClean="0">
-                <a:sym typeface="Wingdings" panose="05000000000000000000" pitchFamily="2" charset="2"/>
-              </a:rPr>
-              <a:t> H0 = </a:t>
-            </a:r>
-            <a:r>
-              <a:rPr lang="fr-FR" dirty="0" err="1" smtClean="0">
-                <a:sym typeface="Wingdings" panose="05000000000000000000" pitchFamily="2" charset="2"/>
-              </a:rPr>
-              <a:t>getHoXm</a:t>
-            </a:r>
-            <a:r>
-              <a:rPr lang="fr-FR" dirty="0" smtClean="0">
-                <a:sym typeface="Wingdings" panose="05000000000000000000" pitchFamily="2" charset="2"/>
-              </a:rPr>
-              <a:t>(</a:t>
-            </a:r>
-            <a:r>
-              <a:rPr lang="fr-FR" dirty="0" smtClean="0"/>
-              <a:t>xmH0</a:t>
-            </a:r>
-            <a:r>
-              <a:rPr lang="fr-FR" dirty="0" smtClean="0"/>
-              <a:t>)	</a:t>
-            </a:r>
-            <a:r>
-              <a:rPr lang="fr-FR" dirty="0" smtClean="0">
-                <a:sym typeface="Wingdings" panose="05000000000000000000" pitchFamily="2" charset="2"/>
-              </a:rPr>
-              <a:t> </a:t>
-            </a:r>
-            <a:r>
-              <a:rPr lang="fr-FR" dirty="0" smtClean="0"/>
-              <a:t>H0 = </a:t>
-            </a:r>
-            <a:r>
-              <a:rPr lang="fr-FR" dirty="0" err="1" smtClean="0"/>
-              <a:t>Hv</a:t>
-            </a:r>
-            <a:r>
-              <a:rPr lang="fr-FR" dirty="0" smtClean="0"/>
-              <a:t> </a:t>
-            </a:r>
-            <a:r>
-              <a:rPr lang="fr-FR" dirty="0"/>
-              <a:t>- </a:t>
-            </a:r>
-            <a:r>
-              <a:rPr lang="fr-FR" dirty="0" err="1"/>
-              <a:t>Rm</a:t>
-            </a:r>
-            <a:r>
-              <a:rPr lang="fr-FR" dirty="0"/>
-              <a:t>/</a:t>
-            </a:r>
-            <a:r>
-              <a:rPr lang="fr-FR" dirty="0" err="1"/>
-              <a:t>zoomx</a:t>
-            </a:r>
-            <a:endParaRPr lang="fr-FR" dirty="0" smtClean="0"/>
-          </a:p>
-          <a:p>
-            <a:r>
-              <a:rPr lang="fr-FR" dirty="0" smtClean="0"/>
-              <a:t>ymP0 = </a:t>
-            </a:r>
-            <a:r>
-              <a:rPr lang="fr-FR" dirty="0" err="1" smtClean="0"/>
-              <a:t>y</a:t>
-            </a:r>
-            <a:r>
-              <a:rPr lang="fr-FR" dirty="0" err="1" smtClean="0"/>
-              <a:t>mP+Rm</a:t>
-            </a:r>
-            <a:r>
-              <a:rPr lang="fr-FR" dirty="0" smtClean="0"/>
-              <a:t>	</a:t>
-            </a:r>
-            <a:r>
-              <a:rPr lang="fr-FR" dirty="0" smtClean="0">
-                <a:sym typeface="Wingdings" panose="05000000000000000000" pitchFamily="2" charset="2"/>
-              </a:rPr>
-              <a:t> P0 = </a:t>
-            </a:r>
-            <a:r>
-              <a:rPr lang="fr-FR" dirty="0" err="1" smtClean="0">
-                <a:sym typeface="Wingdings" panose="05000000000000000000" pitchFamily="2" charset="2"/>
-              </a:rPr>
-              <a:t>getPoYm</a:t>
-            </a:r>
-            <a:r>
-              <a:rPr lang="fr-FR" dirty="0" smtClean="0">
-                <a:sym typeface="Wingdings" panose="05000000000000000000" pitchFamily="2" charset="2"/>
-              </a:rPr>
-              <a:t>(y</a:t>
-            </a:r>
-            <a:r>
-              <a:rPr lang="fr-FR" dirty="0" smtClean="0"/>
-              <a:t>mP0</a:t>
-            </a:r>
-            <a:r>
-              <a:rPr lang="fr-FR" dirty="0" smtClean="0"/>
-              <a:t>)  	</a:t>
-            </a:r>
-            <a:r>
-              <a:rPr lang="fr-FR" dirty="0">
-                <a:sym typeface="Wingdings" panose="05000000000000000000" pitchFamily="2" charset="2"/>
-              </a:rPr>
-              <a:t> LogP0 = (Log10Pv*</a:t>
-            </a:r>
-            <a:r>
-              <a:rPr lang="fr-FR" dirty="0" err="1">
-                <a:sym typeface="Wingdings" panose="05000000000000000000" pitchFamily="2" charset="2"/>
-              </a:rPr>
-              <a:t>zoomy-Rm</a:t>
-            </a:r>
-            <a:r>
-              <a:rPr lang="fr-FR" dirty="0">
-                <a:sym typeface="Wingdings" panose="05000000000000000000" pitchFamily="2" charset="2"/>
-              </a:rPr>
-              <a:t>)/</a:t>
-            </a:r>
-            <a:r>
-              <a:rPr lang="fr-FR" dirty="0" err="1">
-                <a:sym typeface="Wingdings" panose="05000000000000000000" pitchFamily="2" charset="2"/>
-              </a:rPr>
-              <a:t>zoomy</a:t>
-            </a:r>
-            <a:endParaRPr lang="fr-FR" dirty="0"/>
-          </a:p>
-          <a:p>
-            <a:r>
-              <a:rPr lang="fr-FR" dirty="0" smtClean="0"/>
-              <a:t>xmH1 </a:t>
-            </a:r>
-            <a:r>
-              <a:rPr lang="fr-FR" dirty="0"/>
-              <a:t>= </a:t>
-            </a:r>
-            <a:r>
-              <a:rPr lang="fr-FR" dirty="0" err="1" smtClean="0"/>
-              <a:t>xmH+Rm</a:t>
-            </a:r>
-            <a:r>
-              <a:rPr lang="fr-FR" dirty="0"/>
-              <a:t>	</a:t>
-            </a:r>
-            <a:r>
-              <a:rPr lang="fr-FR" dirty="0" smtClean="0">
-                <a:sym typeface="Wingdings" panose="05000000000000000000" pitchFamily="2" charset="2"/>
-              </a:rPr>
-              <a:t> </a:t>
-            </a:r>
-            <a:r>
-              <a:rPr lang="fr-FR" dirty="0">
-                <a:sym typeface="Wingdings" panose="05000000000000000000" pitchFamily="2" charset="2"/>
-              </a:rPr>
-              <a:t>H1 = </a:t>
-            </a:r>
-            <a:r>
-              <a:rPr lang="fr-FR" dirty="0" err="1" smtClean="0">
-                <a:sym typeface="Wingdings" panose="05000000000000000000" pitchFamily="2" charset="2"/>
-              </a:rPr>
-              <a:t>getHoXm</a:t>
-            </a:r>
-            <a:r>
-              <a:rPr lang="fr-FR" dirty="0" smtClean="0">
-                <a:sym typeface="Wingdings" panose="05000000000000000000" pitchFamily="2" charset="2"/>
-              </a:rPr>
-              <a:t>(</a:t>
-            </a:r>
-            <a:r>
-              <a:rPr lang="fr-FR" dirty="0" smtClean="0"/>
-              <a:t>xmH1)</a:t>
-            </a:r>
-            <a:r>
-              <a:rPr lang="fr-FR" dirty="0"/>
-              <a:t>	</a:t>
-            </a:r>
-            <a:r>
-              <a:rPr lang="fr-FR" dirty="0" smtClean="0">
-                <a:sym typeface="Wingdings" panose="05000000000000000000" pitchFamily="2" charset="2"/>
-              </a:rPr>
-              <a:t> </a:t>
-            </a:r>
-            <a:r>
-              <a:rPr lang="fr-FR" dirty="0" err="1" smtClean="0"/>
-              <a:t>w</a:t>
-            </a:r>
-            <a:r>
-              <a:rPr lang="fr-FR" dirty="0" err="1" smtClean="0"/>
-              <a:t>idthH</a:t>
-            </a:r>
-            <a:r>
-              <a:rPr lang="fr-FR" dirty="0" smtClean="0"/>
-              <a:t> = H1-H0</a:t>
-            </a:r>
-            <a:endParaRPr lang="fr-FR" dirty="0"/>
-          </a:p>
-          <a:p>
-            <a:r>
-              <a:rPr lang="fr-FR" dirty="0" smtClean="0"/>
-              <a:t>ymP1 </a:t>
-            </a:r>
-            <a:r>
-              <a:rPr lang="fr-FR" dirty="0"/>
-              <a:t>= </a:t>
-            </a:r>
-            <a:r>
-              <a:rPr lang="fr-FR" dirty="0" err="1" smtClean="0"/>
-              <a:t>ymP-Rm</a:t>
-            </a:r>
-            <a:r>
-              <a:rPr lang="fr-FR" dirty="0" smtClean="0">
-                <a:sym typeface="Wingdings" panose="05000000000000000000" pitchFamily="2" charset="2"/>
-              </a:rPr>
-              <a:t> </a:t>
-            </a:r>
-            <a:r>
-              <a:rPr lang="fr-FR" dirty="0" smtClean="0">
-                <a:sym typeface="Wingdings" panose="05000000000000000000" pitchFamily="2" charset="2"/>
-              </a:rPr>
-              <a:t>	 P1 </a:t>
-            </a:r>
-            <a:r>
-              <a:rPr lang="fr-FR" dirty="0">
-                <a:sym typeface="Wingdings" panose="05000000000000000000" pitchFamily="2" charset="2"/>
-              </a:rPr>
-              <a:t>= </a:t>
-            </a:r>
-            <a:r>
-              <a:rPr lang="fr-FR" dirty="0" err="1" smtClean="0">
-                <a:sym typeface="Wingdings" panose="05000000000000000000" pitchFamily="2" charset="2"/>
-              </a:rPr>
-              <a:t>getPoYm</a:t>
-            </a:r>
-            <a:r>
-              <a:rPr lang="fr-FR" dirty="0" smtClean="0">
-                <a:sym typeface="Wingdings" panose="05000000000000000000" pitchFamily="2" charset="2"/>
-              </a:rPr>
-              <a:t>(y</a:t>
-            </a:r>
-            <a:r>
-              <a:rPr lang="fr-FR" dirty="0" smtClean="0"/>
-              <a:t>mP1</a:t>
-            </a:r>
-            <a:r>
-              <a:rPr lang="fr-FR" dirty="0" smtClean="0"/>
-              <a:t>)  	</a:t>
-            </a:r>
-            <a:r>
-              <a:rPr lang="fr-FR" dirty="0" smtClean="0">
-                <a:sym typeface="Wingdings" panose="05000000000000000000" pitchFamily="2" charset="2"/>
-              </a:rPr>
-              <a:t> P1-P0 = </a:t>
-            </a:r>
-            <a:r>
-              <a:rPr lang="fr-FR" dirty="0" err="1" smtClean="0">
-                <a:sym typeface="Wingdings" panose="05000000000000000000" pitchFamily="2" charset="2"/>
-              </a:rPr>
-              <a:t>height</a:t>
-            </a:r>
-            <a:r>
-              <a:rPr lang="fr-FR" dirty="0" smtClean="0">
-                <a:sym typeface="Wingdings" panose="05000000000000000000" pitchFamily="2" charset="2"/>
-              </a:rPr>
-              <a:t> = </a:t>
-            </a:r>
-            <a:r>
-              <a:rPr lang="fr-FR" dirty="0" smtClean="0">
-                <a:sym typeface="Wingdings" panose="05000000000000000000" pitchFamily="2" charset="2"/>
-              </a:rPr>
-              <a:t>(2*</a:t>
-            </a:r>
-            <a:r>
-              <a:rPr lang="fr-FR" dirty="0" err="1" smtClean="0">
-                <a:sym typeface="Wingdings" panose="05000000000000000000" pitchFamily="2" charset="2"/>
-              </a:rPr>
-              <a:t>Rm</a:t>
-            </a:r>
-            <a:r>
-              <a:rPr lang="fr-FR" dirty="0">
-                <a:sym typeface="Wingdings" panose="05000000000000000000" pitchFamily="2" charset="2"/>
-              </a:rPr>
-              <a:t>)/</a:t>
-            </a:r>
-            <a:r>
-              <a:rPr lang="fr-FR" dirty="0" err="1">
-                <a:sym typeface="Wingdings" panose="05000000000000000000" pitchFamily="2" charset="2"/>
-              </a:rPr>
-              <a:t>zoomy</a:t>
-            </a:r>
-            <a:endParaRPr lang="fr-FR" dirty="0">
-              <a:sym typeface="Wingdings" panose="05000000000000000000" pitchFamily="2" charset="2"/>
-            </a:endParaRPr>
-          </a:p>
-          <a:p>
-            <a:endParaRPr lang="fr-FR" dirty="0"/>
-          </a:p>
-        </p:txBody>
-      </p:sp>
-      <p:sp>
-        <p:nvSpPr>
-          <p:cNvPr id="17" name="ZoneTexte 16"/>
-          <p:cNvSpPr txBox="1"/>
-          <p:nvPr/>
-        </p:nvSpPr>
-        <p:spPr>
-          <a:xfrm>
-            <a:off x="3306051" y="1988840"/>
-            <a:ext cx="5708166" cy="646331"/>
-          </a:xfrm>
-          <a:prstGeom prst="rect">
-            <a:avLst/>
-          </a:prstGeom>
-          <a:noFill/>
-        </p:spPr>
-        <p:txBody>
-          <a:bodyPr wrap="none" rtlCol="0">
-            <a:spAutoFit/>
-          </a:bodyPr>
-          <a:lstStyle/>
-          <a:p>
-            <a:r>
-              <a:rPr lang="fr-FR" dirty="0" smtClean="0"/>
-              <a:t>Circle </a:t>
-            </a:r>
-            <a:r>
-              <a:rPr lang="fr-FR" dirty="0" err="1" smtClean="0"/>
-              <a:t>is</a:t>
-            </a:r>
-            <a:r>
-              <a:rPr lang="fr-FR" dirty="0" smtClean="0"/>
-              <a:t> </a:t>
-            </a:r>
-            <a:r>
-              <a:rPr lang="fr-FR" dirty="0" err="1" smtClean="0"/>
-              <a:t>drawn</a:t>
-            </a:r>
-            <a:r>
-              <a:rPr lang="fr-FR" dirty="0" smtClean="0"/>
-              <a:t> </a:t>
-            </a:r>
-            <a:r>
-              <a:rPr lang="fr-FR" dirty="0" err="1" smtClean="0"/>
-              <a:t>inside</a:t>
-            </a:r>
-            <a:r>
-              <a:rPr lang="fr-FR" dirty="0" smtClean="0"/>
-              <a:t> a square, </a:t>
-            </a:r>
-            <a:r>
-              <a:rPr lang="fr-FR" dirty="0" err="1" smtClean="0"/>
-              <a:t>so</a:t>
-            </a:r>
-            <a:r>
-              <a:rPr lang="fr-FR" dirty="0" smtClean="0"/>
-              <a:t> </a:t>
-            </a:r>
-            <a:r>
-              <a:rPr lang="fr-FR" dirty="0" err="1" smtClean="0"/>
-              <a:t>we</a:t>
-            </a:r>
-            <a:r>
-              <a:rPr lang="fr-FR" dirty="0" smtClean="0"/>
-              <a:t> </a:t>
-            </a:r>
-            <a:r>
-              <a:rPr lang="fr-FR" dirty="0" err="1" smtClean="0"/>
-              <a:t>need</a:t>
-            </a:r>
-            <a:r>
-              <a:rPr lang="fr-FR" dirty="0" smtClean="0"/>
-              <a:t> </a:t>
-            </a:r>
-            <a:r>
-              <a:rPr lang="fr-FR" dirty="0" smtClean="0"/>
-              <a:t>the </a:t>
-            </a:r>
-            <a:r>
-              <a:rPr lang="fr-FR" dirty="0" err="1" smtClean="0"/>
-              <a:t>coordinates</a:t>
-            </a:r>
-            <a:endParaRPr lang="fr-FR" dirty="0" smtClean="0"/>
-          </a:p>
-          <a:p>
-            <a:r>
-              <a:rPr lang="fr-FR" dirty="0" smtClean="0"/>
-              <a:t>P0,Log10P0, </a:t>
-            </a:r>
-            <a:r>
-              <a:rPr lang="fr-FR" dirty="0" err="1" smtClean="0"/>
-              <a:t>width</a:t>
-            </a:r>
-            <a:r>
-              <a:rPr lang="fr-FR" dirty="0" smtClean="0"/>
-              <a:t>, </a:t>
-            </a:r>
-            <a:r>
-              <a:rPr lang="fr-FR" dirty="0" err="1" smtClean="0"/>
-              <a:t>Height</a:t>
-            </a:r>
-            <a:r>
-              <a:rPr lang="fr-FR" dirty="0" smtClean="0"/>
-              <a:t> </a:t>
-            </a:r>
-          </a:p>
-        </p:txBody>
-      </p:sp>
-      <p:sp>
-        <p:nvSpPr>
-          <p:cNvPr id="18" name="ZoneTexte 17"/>
-          <p:cNvSpPr txBox="1"/>
-          <p:nvPr/>
-        </p:nvSpPr>
-        <p:spPr>
-          <a:xfrm>
-            <a:off x="132887" y="14639"/>
-            <a:ext cx="1311578" cy="646331"/>
-          </a:xfrm>
-          <a:prstGeom prst="rect">
-            <a:avLst/>
-          </a:prstGeom>
-          <a:noFill/>
-        </p:spPr>
-        <p:txBody>
-          <a:bodyPr wrap="none" rtlCol="0">
-            <a:spAutoFit/>
-          </a:bodyPr>
-          <a:lstStyle/>
-          <a:p>
-            <a:r>
-              <a:rPr lang="fr-FR" smtClean="0"/>
-              <a:t>H0,Log10P0</a:t>
-            </a:r>
-            <a:endParaRPr lang="fr-FR" dirty="0"/>
-          </a:p>
-          <a:p>
-            <a:r>
-              <a:rPr lang="fr-FR" dirty="0" smtClean="0"/>
-              <a:t>xmH0,ymP0</a:t>
-            </a:r>
-          </a:p>
-        </p:txBody>
-      </p:sp>
-      <p:sp>
-        <p:nvSpPr>
-          <p:cNvPr id="19" name="ZoneTexte 18"/>
-          <p:cNvSpPr txBox="1"/>
-          <p:nvPr/>
-        </p:nvSpPr>
-        <p:spPr>
-          <a:xfrm>
-            <a:off x="2197951" y="2779430"/>
-            <a:ext cx="1311578" cy="646331"/>
-          </a:xfrm>
-          <a:prstGeom prst="rect">
-            <a:avLst/>
-          </a:prstGeom>
-          <a:noFill/>
-        </p:spPr>
-        <p:txBody>
-          <a:bodyPr wrap="none" rtlCol="0">
-            <a:spAutoFit/>
-          </a:bodyPr>
-          <a:lstStyle/>
-          <a:p>
-            <a:r>
-              <a:rPr lang="fr-FR" dirty="0" smtClean="0"/>
-              <a:t>H1,LogP1</a:t>
-            </a:r>
-            <a:endParaRPr lang="fr-FR" dirty="0" smtClean="0"/>
-          </a:p>
-          <a:p>
-            <a:r>
-              <a:rPr lang="fr-FR" dirty="0" smtClean="0"/>
-              <a:t>xmH1,ymP0</a:t>
-            </a:r>
-            <a:endParaRPr lang="fr-FR" dirty="0"/>
-          </a:p>
-        </p:txBody>
-      </p:sp>
-      <p:cxnSp>
-        <p:nvCxnSpPr>
-          <p:cNvPr id="5" name="Connecteur droit avec flèche 4"/>
-          <p:cNvCxnSpPr/>
-          <p:nvPr/>
-        </p:nvCxnSpPr>
-        <p:spPr>
-          <a:xfrm>
-            <a:off x="799980" y="664716"/>
-            <a:ext cx="1878763" cy="0"/>
-          </a:xfrm>
-          <a:prstGeom prst="straightConnector1">
-            <a:avLst/>
-          </a:prstGeom>
-          <a:ln>
-            <a:headEnd type="arrow"/>
-            <a:tailEnd type="arrow"/>
-          </a:ln>
-        </p:spPr>
-        <p:style>
-          <a:lnRef idx="1">
-            <a:schemeClr val="accent1"/>
-          </a:lnRef>
-          <a:fillRef idx="0">
-            <a:schemeClr val="accent1"/>
-          </a:fillRef>
-          <a:effectRef idx="0">
-            <a:schemeClr val="accent1"/>
-          </a:effectRef>
-          <a:fontRef idx="minor">
-            <a:schemeClr val="tx1"/>
-          </a:fontRef>
-        </p:style>
-      </p:cxnSp>
-      <p:sp>
-        <p:nvSpPr>
-          <p:cNvPr id="7" name="ZoneTexte 6"/>
-          <p:cNvSpPr txBox="1"/>
-          <p:nvPr/>
-        </p:nvSpPr>
-        <p:spPr>
-          <a:xfrm>
-            <a:off x="1928486" y="291638"/>
-            <a:ext cx="867545" cy="369332"/>
-          </a:xfrm>
-          <a:prstGeom prst="rect">
-            <a:avLst/>
-          </a:prstGeom>
-          <a:noFill/>
-        </p:spPr>
-        <p:txBody>
-          <a:bodyPr wrap="none" rtlCol="0">
-            <a:spAutoFit/>
-          </a:bodyPr>
-          <a:lstStyle/>
-          <a:p>
-            <a:r>
-              <a:rPr lang="fr-FR" dirty="0" err="1" smtClean="0"/>
-              <a:t>widthH</a:t>
-            </a:r>
-            <a:endParaRPr lang="fr-FR" dirty="0"/>
-          </a:p>
-        </p:txBody>
-      </p:sp>
-      <p:cxnSp>
-        <p:nvCxnSpPr>
-          <p:cNvPr id="20" name="Connecteur droit avec flèche 19"/>
-          <p:cNvCxnSpPr/>
-          <p:nvPr/>
-        </p:nvCxnSpPr>
-        <p:spPr>
-          <a:xfrm>
-            <a:off x="2853740" y="804231"/>
-            <a:ext cx="0" cy="1962314"/>
-          </a:xfrm>
-          <a:prstGeom prst="straightConnector1">
-            <a:avLst/>
-          </a:prstGeom>
-          <a:ln>
-            <a:headEnd type="arrow"/>
-            <a:tailEnd type="arrow"/>
-          </a:ln>
-        </p:spPr>
-        <p:style>
-          <a:lnRef idx="1">
-            <a:schemeClr val="accent1"/>
-          </a:lnRef>
-          <a:fillRef idx="0">
-            <a:schemeClr val="accent1"/>
-          </a:fillRef>
-          <a:effectRef idx="0">
-            <a:schemeClr val="accent1"/>
-          </a:effectRef>
-          <a:fontRef idx="minor">
-            <a:schemeClr val="tx1"/>
-          </a:fontRef>
-        </p:style>
-      </p:cxnSp>
-      <p:sp>
-        <p:nvSpPr>
-          <p:cNvPr id="13" name="ZoneTexte 12"/>
-          <p:cNvSpPr txBox="1"/>
-          <p:nvPr/>
-        </p:nvSpPr>
-        <p:spPr>
-          <a:xfrm>
-            <a:off x="2915816" y="1227999"/>
-            <a:ext cx="899092" cy="369332"/>
-          </a:xfrm>
-          <a:prstGeom prst="rect">
-            <a:avLst/>
-          </a:prstGeom>
-          <a:noFill/>
-        </p:spPr>
-        <p:txBody>
-          <a:bodyPr wrap="none" rtlCol="0">
-            <a:spAutoFit/>
-          </a:bodyPr>
-          <a:lstStyle/>
-          <a:p>
-            <a:r>
-              <a:rPr lang="fr-FR" dirty="0" err="1" smtClean="0"/>
-              <a:t>heightP</a:t>
-            </a:r>
-            <a:endParaRPr lang="fr-FR" dirty="0"/>
-          </a:p>
-        </p:txBody>
-      </p:sp>
-    </p:spTree>
-    <p:extLst>
-      <p:ext uri="{BB962C8B-B14F-4D97-AF65-F5344CB8AC3E}">
-        <p14:creationId xmlns:p14="http://schemas.microsoft.com/office/powerpoint/2010/main" val="3680730969"/>
       </p:ext>
     </p:extLst>
   </p:cSld>

</xml_diff>